<commit_message>
Changing intro and debriefing slides
</commit_message>
<xml_diff>
--- a/EPRIME procedura png/Slajdy_Dprime.pptx
+++ b/EPRIME procedura png/Slajdy_Dprime.pptx
@@ -207,7 +207,7 @@
           <a:p>
             <a:fld id="{D628A058-5DBC-41CE-B381-E249999ED40E}" type="datetimeFigureOut">
               <a:rPr lang="en-US" smtClean="0"/>
-              <a:t>2/20/2018</a:t>
+              <a:t>3/1/2018</a:t>
             </a:fld>
             <a:endParaRPr lang="en-US"/>
           </a:p>
@@ -621,7 +621,7 @@
           <a:p>
             <a:fld id="{445E621E-B824-4DF2-A6B1-90CE9D9DDCE7}" type="datetimeFigureOut">
               <a:rPr lang="en-US" smtClean="0"/>
-              <a:t>2/20/2018</a:t>
+              <a:t>3/1/2018</a:t>
             </a:fld>
             <a:endParaRPr lang="en-US"/>
           </a:p>
@@ -819,7 +819,7 @@
           <a:p>
             <a:fld id="{445E621E-B824-4DF2-A6B1-90CE9D9DDCE7}" type="datetimeFigureOut">
               <a:rPr lang="en-US" smtClean="0"/>
-              <a:t>2/20/2018</a:t>
+              <a:t>3/1/2018</a:t>
             </a:fld>
             <a:endParaRPr lang="en-US"/>
           </a:p>
@@ -1027,7 +1027,7 @@
           <a:p>
             <a:fld id="{445E621E-B824-4DF2-A6B1-90CE9D9DDCE7}" type="datetimeFigureOut">
               <a:rPr lang="en-US" smtClean="0"/>
-              <a:t>2/20/2018</a:t>
+              <a:t>3/1/2018</a:t>
             </a:fld>
             <a:endParaRPr lang="en-US"/>
           </a:p>
@@ -1225,7 +1225,7 @@
           <a:p>
             <a:fld id="{445E621E-B824-4DF2-A6B1-90CE9D9DDCE7}" type="datetimeFigureOut">
               <a:rPr lang="en-US" smtClean="0"/>
-              <a:t>2/20/2018</a:t>
+              <a:t>3/1/2018</a:t>
             </a:fld>
             <a:endParaRPr lang="en-US"/>
           </a:p>
@@ -1500,7 +1500,7 @@
           <a:p>
             <a:fld id="{445E621E-B824-4DF2-A6B1-90CE9D9DDCE7}" type="datetimeFigureOut">
               <a:rPr lang="en-US" smtClean="0"/>
-              <a:t>2/20/2018</a:t>
+              <a:t>3/1/2018</a:t>
             </a:fld>
             <a:endParaRPr lang="en-US"/>
           </a:p>
@@ -1765,7 +1765,7 @@
           <a:p>
             <a:fld id="{445E621E-B824-4DF2-A6B1-90CE9D9DDCE7}" type="datetimeFigureOut">
               <a:rPr lang="en-US" smtClean="0"/>
-              <a:t>2/20/2018</a:t>
+              <a:t>3/1/2018</a:t>
             </a:fld>
             <a:endParaRPr lang="en-US"/>
           </a:p>
@@ -2177,7 +2177,7 @@
           <a:p>
             <a:fld id="{445E621E-B824-4DF2-A6B1-90CE9D9DDCE7}" type="datetimeFigureOut">
               <a:rPr lang="en-US" smtClean="0"/>
-              <a:t>2/20/2018</a:t>
+              <a:t>3/1/2018</a:t>
             </a:fld>
             <a:endParaRPr lang="en-US"/>
           </a:p>
@@ -2318,7 +2318,7 @@
           <a:p>
             <a:fld id="{445E621E-B824-4DF2-A6B1-90CE9D9DDCE7}" type="datetimeFigureOut">
               <a:rPr lang="en-US" smtClean="0"/>
-              <a:t>2/20/2018</a:t>
+              <a:t>3/1/2018</a:t>
             </a:fld>
             <a:endParaRPr lang="en-US"/>
           </a:p>
@@ -2431,7 +2431,7 @@
           <a:p>
             <a:fld id="{445E621E-B824-4DF2-A6B1-90CE9D9DDCE7}" type="datetimeFigureOut">
               <a:rPr lang="en-US" smtClean="0"/>
-              <a:t>2/20/2018</a:t>
+              <a:t>3/1/2018</a:t>
             </a:fld>
             <a:endParaRPr lang="en-US"/>
           </a:p>
@@ -2742,7 +2742,7 @@
           <a:p>
             <a:fld id="{445E621E-B824-4DF2-A6B1-90CE9D9DDCE7}" type="datetimeFigureOut">
               <a:rPr lang="en-US" smtClean="0"/>
-              <a:t>2/20/2018</a:t>
+              <a:t>3/1/2018</a:t>
             </a:fld>
             <a:endParaRPr lang="en-US"/>
           </a:p>
@@ -3030,7 +3030,7 @@
           <a:p>
             <a:fld id="{445E621E-B824-4DF2-A6B1-90CE9D9DDCE7}" type="datetimeFigureOut">
               <a:rPr lang="en-US" smtClean="0"/>
-              <a:t>2/20/2018</a:t>
+              <a:t>3/1/2018</a:t>
             </a:fld>
             <a:endParaRPr lang="en-US"/>
           </a:p>
@@ -3271,7 +3271,7 @@
           <a:p>
             <a:fld id="{445E621E-B824-4DF2-A6B1-90CE9D9DDCE7}" type="datetimeFigureOut">
               <a:rPr lang="en-US" smtClean="0"/>
-              <a:t>2/20/2018</a:t>
+              <a:t>3/1/2018</a:t>
             </a:fld>
             <a:endParaRPr lang="en-US"/>
           </a:p>
@@ -7603,7 +7603,41 @@
                 <a:ea typeface="+mn-ea"/>
                 <a:cs typeface="+mn-cs"/>
               </a:rPr>
-              <a:t>Proszę zupełnie ignorować kierunek poniższych bodźców:</a:t>
+              <a:t>Proszę zupełnie </a:t>
+            </a:r>
+            <a:r>
+              <a:rPr kumimoji="0" lang="pl-PL" sz="2200" b="0" i="0" u="none" strike="noStrike" kern="1200" cap="none" spc="0" normalizeH="0" baseline="0" noProof="0" dirty="0">
+                <a:ln>
+                  <a:noFill/>
+                </a:ln>
+                <a:solidFill>
+                  <a:srgbClr val="FF0000"/>
+                </a:solidFill>
+                <a:effectLst/>
+                <a:uLnTx/>
+                <a:uFillTx/>
+                <a:latin typeface="Calibri" panose="020F0502020204030204"/>
+                <a:ea typeface="+mn-ea"/>
+                <a:cs typeface="+mn-cs"/>
+              </a:rPr>
+              <a:t>ignorować</a:t>
+            </a:r>
+            <a:r>
+              <a:rPr kumimoji="0" lang="pl-PL" sz="2200" b="0" i="0" u="none" strike="noStrike" kern="1200" cap="none" spc="0" normalizeH="0" baseline="0" noProof="0" dirty="0">
+                <a:ln>
+                  <a:noFill/>
+                </a:ln>
+                <a:solidFill>
+                  <a:prstClr val="white"/>
+                </a:solidFill>
+                <a:effectLst/>
+                <a:uLnTx/>
+                <a:uFillTx/>
+                <a:latin typeface="Calibri" panose="020F0502020204030204"/>
+                <a:ea typeface="+mn-ea"/>
+                <a:cs typeface="+mn-cs"/>
+              </a:rPr>
+              <a:t> kierunek poniższych strzałek:</a:t>
             </a:r>
             <a:endParaRPr kumimoji="0" lang="en-US" sz="2200" b="0" i="0" u="none" strike="noStrike" kern="1200" cap="none" spc="0" normalizeH="0" baseline="0" noProof="0" dirty="0">
               <a:ln>

</xml_diff>